<commit_message>
Improve plots, add full analog sim and corner sim
</commit_message>
<xml_diff>
--- a/report/graphs/camera_controller_pinout.pptx
+++ b/report/graphs/camera_controller_pinout.pptx
@@ -104,6 +104,11 @@
       </a:defRPr>
     </a:lvl9pPr>
   </p:defaultTextStyle>
+  <p:extLst>
+    <p:ext uri="{EFAFB233-063F-42B5-8137-9DF3F51BA10A}">
+      <p15:sldGuideLst xmlns:p15="http://schemas.microsoft.com/office/powerpoint/2012/main"/>
+    </p:ext>
+  </p:extLst>
 </p:presentation>
 </file>
 
@@ -254,7 +259,7 @@
           <a:p>
             <a:fld id="{23E372B3-F156-46A4-8B0E-EDF8E7B96FF4}" type="datetimeFigureOut">
               <a:rPr lang="en-US" smtClean="0"/>
-              <a:t>2020-11-10</a:t>
+              <a:t>2020-11-17</a:t>
             </a:fld>
             <a:endParaRPr lang="en-US"/>
           </a:p>
@@ -452,7 +457,7 @@
           <a:p>
             <a:fld id="{23E372B3-F156-46A4-8B0E-EDF8E7B96FF4}" type="datetimeFigureOut">
               <a:rPr lang="en-US" smtClean="0"/>
-              <a:t>2020-11-10</a:t>
+              <a:t>2020-11-17</a:t>
             </a:fld>
             <a:endParaRPr lang="en-US"/>
           </a:p>
@@ -660,7 +665,7 @@
           <a:p>
             <a:fld id="{23E372B3-F156-46A4-8B0E-EDF8E7B96FF4}" type="datetimeFigureOut">
               <a:rPr lang="en-US" smtClean="0"/>
-              <a:t>2020-11-10</a:t>
+              <a:t>2020-11-17</a:t>
             </a:fld>
             <a:endParaRPr lang="en-US"/>
           </a:p>
@@ -858,7 +863,7 @@
           <a:p>
             <a:fld id="{23E372B3-F156-46A4-8B0E-EDF8E7B96FF4}" type="datetimeFigureOut">
               <a:rPr lang="en-US" smtClean="0"/>
-              <a:t>2020-11-10</a:t>
+              <a:t>2020-11-17</a:t>
             </a:fld>
             <a:endParaRPr lang="en-US"/>
           </a:p>
@@ -1133,7 +1138,7 @@
           <a:p>
             <a:fld id="{23E372B3-F156-46A4-8B0E-EDF8E7B96FF4}" type="datetimeFigureOut">
               <a:rPr lang="en-US" smtClean="0"/>
-              <a:t>2020-11-10</a:t>
+              <a:t>2020-11-17</a:t>
             </a:fld>
             <a:endParaRPr lang="en-US"/>
           </a:p>
@@ -1398,7 +1403,7 @@
           <a:p>
             <a:fld id="{23E372B3-F156-46A4-8B0E-EDF8E7B96FF4}" type="datetimeFigureOut">
               <a:rPr lang="en-US" smtClean="0"/>
-              <a:t>2020-11-10</a:t>
+              <a:t>2020-11-17</a:t>
             </a:fld>
             <a:endParaRPr lang="en-US"/>
           </a:p>
@@ -1810,7 +1815,7 @@
           <a:p>
             <a:fld id="{23E372B3-F156-46A4-8B0E-EDF8E7B96FF4}" type="datetimeFigureOut">
               <a:rPr lang="en-US" smtClean="0"/>
-              <a:t>2020-11-10</a:t>
+              <a:t>2020-11-17</a:t>
             </a:fld>
             <a:endParaRPr lang="en-US"/>
           </a:p>
@@ -1951,7 +1956,7 @@
           <a:p>
             <a:fld id="{23E372B3-F156-46A4-8B0E-EDF8E7B96FF4}" type="datetimeFigureOut">
               <a:rPr lang="en-US" smtClean="0"/>
-              <a:t>2020-11-10</a:t>
+              <a:t>2020-11-17</a:t>
             </a:fld>
             <a:endParaRPr lang="en-US"/>
           </a:p>
@@ -2064,7 +2069,7 @@
           <a:p>
             <a:fld id="{23E372B3-F156-46A4-8B0E-EDF8E7B96FF4}" type="datetimeFigureOut">
               <a:rPr lang="en-US" smtClean="0"/>
-              <a:t>2020-11-10</a:t>
+              <a:t>2020-11-17</a:t>
             </a:fld>
             <a:endParaRPr lang="en-US"/>
           </a:p>
@@ -2375,7 +2380,7 @@
           <a:p>
             <a:fld id="{23E372B3-F156-46A4-8B0E-EDF8E7B96FF4}" type="datetimeFigureOut">
               <a:rPr lang="en-US" smtClean="0"/>
-              <a:t>2020-11-10</a:t>
+              <a:t>2020-11-17</a:t>
             </a:fld>
             <a:endParaRPr lang="en-US"/>
           </a:p>
@@ -2663,7 +2668,7 @@
           <a:p>
             <a:fld id="{23E372B3-F156-46A4-8B0E-EDF8E7B96FF4}" type="datetimeFigureOut">
               <a:rPr lang="en-US" smtClean="0"/>
-              <a:t>2020-11-10</a:t>
+              <a:t>2020-11-17</a:t>
             </a:fld>
             <a:endParaRPr lang="en-US"/>
           </a:p>
@@ -2904,7 +2909,7 @@
           <a:p>
             <a:fld id="{23E372B3-F156-46A4-8B0E-EDF8E7B96FF4}" type="datetimeFigureOut">
               <a:rPr lang="en-US" smtClean="0"/>
-              <a:t>2020-11-10</a:t>
+              <a:t>2020-11-17</a:t>
             </a:fld>
             <a:endParaRPr lang="en-US"/>
           </a:p>
@@ -3335,10 +3340,10 @@
         </p:nvGrpSpPr>
         <p:grpSpPr>
           <a:xfrm>
-            <a:off x="2467992" y="1895589"/>
-            <a:ext cx="4643025" cy="2339060"/>
-            <a:chOff x="3169328" y="1700280"/>
-            <a:chExt cx="4643025" cy="2339060"/>
+            <a:off x="2358576" y="1952371"/>
+            <a:ext cx="3213793" cy="2313540"/>
+            <a:chOff x="3169328" y="1725800"/>
+            <a:chExt cx="4643025" cy="2313540"/>
           </a:xfrm>
         </p:grpSpPr>
         <p:grpSp>
@@ -3355,10 +3360,10 @@
           </p:nvGrpSpPr>
           <p:grpSpPr>
             <a:xfrm>
-              <a:off x="3444536" y="1700280"/>
-              <a:ext cx="4110361" cy="2339060"/>
-              <a:chOff x="3515557" y="998945"/>
-              <a:chExt cx="4110361" cy="2339060"/>
+              <a:off x="3444536" y="1725800"/>
+              <a:ext cx="4110361" cy="2313540"/>
+              <a:chOff x="3515557" y="1024465"/>
+              <a:chExt cx="4110361" cy="2313540"/>
             </a:xfrm>
           </p:grpSpPr>
           <p:sp>
@@ -3427,8 +3432,8 @@
             </p:nvSpPr>
             <p:spPr>
               <a:xfrm>
-                <a:off x="6582611" y="1440892"/>
-                <a:ext cx="870751" cy="1754326"/>
+                <a:off x="6233182" y="1444838"/>
+                <a:ext cx="1370549" cy="1754326"/>
               </a:xfrm>
               <a:prstGeom prst="rect">
                 <a:avLst/>
@@ -3436,7 +3441,7 @@
               <a:noFill/>
             </p:spPr>
             <p:txBody>
-              <a:bodyPr wrap="none" rtlCol="0">
+              <a:bodyPr wrap="square" rtlCol="0">
                 <a:spAutoFit/>
               </a:bodyPr>
               <a:lstStyle/>
@@ -3480,61 +3485,6 @@
           </p:sp>
           <p:sp>
             <p:nvSpPr>
-              <p:cNvPr id="9" name="TextBox 8">
-                <a:extLst>
-                  <a:ext uri="{FF2B5EF4-FFF2-40B4-BE49-F238E27FC236}">
-                    <a16:creationId xmlns:a16="http://schemas.microsoft.com/office/drawing/2014/main" id="{FAF4BC29-493D-49AE-B129-FA6561568DE1}"/>
-                  </a:ext>
-                </a:extLst>
-              </p:cNvPr>
-              <p:cNvSpPr txBox="1"/>
-              <p:nvPr/>
-            </p:nvSpPr>
-            <p:spPr>
-              <a:xfrm>
-                <a:off x="5345526" y="1444838"/>
-                <a:ext cx="1062855" cy="1200329"/>
-              </a:xfrm>
-              <a:prstGeom prst="rect">
-                <a:avLst/>
-              </a:prstGeom>
-              <a:noFill/>
-            </p:spPr>
-            <p:txBody>
-              <a:bodyPr wrap="none" rtlCol="0">
-                <a:spAutoFit/>
-              </a:bodyPr>
-              <a:lstStyle/>
-              <a:p>
-                <a:r>
-                  <a:rPr lang="en-US" b="1" dirty="0"/>
-                  <a:t>Internal</a:t>
-                </a:r>
-              </a:p>
-              <a:p>
-                <a:r>
-                  <a:rPr lang="en-US" dirty="0" err="1"/>
-                  <a:t>exp_time</a:t>
-                </a:r>
-                <a:endParaRPr lang="en-US" dirty="0"/>
-              </a:p>
-              <a:p>
-                <a:r>
-                  <a:rPr lang="en-US" dirty="0" err="1"/>
-                  <a:t>cnt</a:t>
-                </a:r>
-                <a:endParaRPr lang="en-US" dirty="0"/>
-              </a:p>
-              <a:p>
-                <a:r>
-                  <a:rPr lang="en-US" dirty="0"/>
-                  <a:t>state</a:t>
-                </a:r>
-              </a:p>
-            </p:txBody>
-          </p:sp>
-          <p:sp>
-            <p:nvSpPr>
               <p:cNvPr id="13" name="TextBox 12">
                 <a:extLst>
                   <a:ext uri="{FF2B5EF4-FFF2-40B4-BE49-F238E27FC236}">
@@ -3547,8 +3497,8 @@
             </p:nvSpPr>
             <p:spPr>
               <a:xfrm>
-                <a:off x="4603805" y="998945"/>
-                <a:ext cx="1933863" cy="369332"/>
+                <a:off x="4168064" y="1024465"/>
+                <a:ext cx="2805345" cy="369332"/>
               </a:xfrm>
               <a:prstGeom prst="rect">
                 <a:avLst/>
@@ -3556,7 +3506,7 @@
               <a:noFill/>
             </p:spPr>
             <p:txBody>
-              <a:bodyPr wrap="none" rtlCol="0">
+              <a:bodyPr wrap="square" rtlCol="0">
                 <a:spAutoFit/>
               </a:bodyPr>
               <a:lstStyle/>
@@ -3583,8 +3533,8 @@
             </p:nvSpPr>
             <p:spPr>
               <a:xfrm>
-                <a:off x="3694249" y="1444838"/>
-                <a:ext cx="1476623" cy="1754326"/>
+                <a:off x="3694248" y="1444838"/>
+                <a:ext cx="2204556" cy="1754326"/>
               </a:xfrm>
               <a:prstGeom prst="rect">
                 <a:avLst/>
@@ -3592,7 +3542,7 @@
               <a:noFill/>
             </p:spPr>
             <p:txBody>
-              <a:bodyPr wrap="none" rtlCol="0">
+              <a:bodyPr wrap="square" rtlCol="0">
                 <a:spAutoFit/>
               </a:bodyPr>
               <a:lstStyle/>

</xml_diff>

<commit_message>
Write EXPOSE capitalized in pinout figures
</commit_message>
<xml_diff>
--- a/report/graphs/camera_controller_pinout.pptx
+++ b/report/graphs/camera_controller_pinout.pptx
@@ -6,6 +6,7 @@
   </p:sldMasterIdLst>
   <p:sldIdLst>
     <p:sldId id="256" r:id="rId2"/>
+    <p:sldId id="257" r:id="rId3"/>
   </p:sldIdLst>
   <p:sldSz cx="12192000" cy="6858000"/>
   <p:notesSz cx="6858000" cy="9144000"/>
@@ -110,6 +111,14 @@
     </p:ext>
   </p:extLst>
 </p:presentation>
+</file>
+
+<file path=ppt/revisionInfo.xml><?xml version="1.0" encoding="utf-8"?>
+<p1510:revInfo xmlns:a="http://schemas.openxmlformats.org/drawingml/2006/main" xmlns:r="http://schemas.openxmlformats.org/officeDocument/2006/relationships" xmlns:p1510="http://schemas.microsoft.com/office/powerpoint/2015/10/main">
+  <p1510:revLst>
+    <p1510:client id="{0B6EB388-D039-40C4-9DA8-7014E21C2771}" v="1" dt="2020-11-17T19:23:30.037"/>
+  </p1510:revLst>
+</p1510:revInfo>
 </file>
 
 <file path=ppt/slideLayouts/slideLayout1.xml><?xml version="1.0" encoding="utf-8"?>
@@ -3472,14 +3481,15 @@
               <a:p>
                 <a:r>
                   <a:rPr lang="en-US" dirty="0"/>
-                  <a:t>expose</a:t>
+                  <a:t>EXPOSE</a:t>
                 </a:r>
               </a:p>
               <a:p>
                 <a:r>
-                  <a:rPr lang="en-US" dirty="0"/>
-                  <a:t>erase</a:t>
+                  <a:rPr lang="en-US"/>
+                  <a:t>ERASE</a:t>
                 </a:r>
+                <a:endParaRPr lang="en-US" dirty="0"/>
               </a:p>
             </p:txBody>
           </p:sp>
@@ -4077,6 +4087,838 @@
     <p:extLst>
       <p:ext uri="{BB962C8B-B14F-4D97-AF65-F5344CB8AC3E}">
         <p14:creationId xmlns:p14="http://schemas.microsoft.com/office/powerpoint/2010/main" val="3961199719"/>
+      </p:ext>
+    </p:extLst>
+  </p:cSld>
+  <p:clrMapOvr>
+    <a:masterClrMapping/>
+  </p:clrMapOvr>
+</p:sld>
+</file>
+
+<file path=ppt/slides/slide2.xml><?xml version="1.0" encoding="utf-8"?>
+<p:sld xmlns:a="http://schemas.openxmlformats.org/drawingml/2006/main" xmlns:r="http://schemas.openxmlformats.org/officeDocument/2006/relationships" xmlns:p="http://schemas.openxmlformats.org/presentationml/2006/main">
+  <p:cSld>
+    <p:spTree>
+      <p:nvGrpSpPr>
+        <p:cNvPr id="1" name=""/>
+        <p:cNvGrpSpPr/>
+        <p:nvPr/>
+      </p:nvGrpSpPr>
+      <p:grpSpPr>
+        <a:xfrm>
+          <a:off x="0" y="0"/>
+          <a:ext cx="0" cy="0"/>
+          <a:chOff x="0" y="0"/>
+          <a:chExt cx="0" cy="0"/>
+        </a:xfrm>
+      </p:grpSpPr>
+      <p:grpSp>
+        <p:nvGrpSpPr>
+          <p:cNvPr id="57" name="Group 56">
+            <a:extLst>
+              <a:ext uri="{FF2B5EF4-FFF2-40B4-BE49-F238E27FC236}">
+                <a16:creationId xmlns:a16="http://schemas.microsoft.com/office/drawing/2014/main" id="{B4250D7B-ED36-4832-872C-E94D16813EFA}"/>
+              </a:ext>
+            </a:extLst>
+          </p:cNvPr>
+          <p:cNvGrpSpPr/>
+          <p:nvPr/>
+        </p:nvGrpSpPr>
+        <p:grpSpPr>
+          <a:xfrm>
+            <a:off x="2467992" y="1895589"/>
+            <a:ext cx="4643025" cy="2339060"/>
+            <a:chOff x="3169328" y="1700280"/>
+            <a:chExt cx="4643025" cy="2339060"/>
+          </a:xfrm>
+        </p:grpSpPr>
+        <p:grpSp>
+          <p:nvGrpSpPr>
+            <p:cNvPr id="31" name="Group 30">
+              <a:extLst>
+                <a:ext uri="{FF2B5EF4-FFF2-40B4-BE49-F238E27FC236}">
+                  <a16:creationId xmlns:a16="http://schemas.microsoft.com/office/drawing/2014/main" id="{0997A473-F688-44BE-AF2B-2C2784C47DC8}"/>
+                </a:ext>
+              </a:extLst>
+            </p:cNvPr>
+            <p:cNvGrpSpPr/>
+            <p:nvPr/>
+          </p:nvGrpSpPr>
+          <p:grpSpPr>
+            <a:xfrm>
+              <a:off x="3444536" y="1700280"/>
+              <a:ext cx="4110361" cy="2339060"/>
+              <a:chOff x="3515557" y="998945"/>
+              <a:chExt cx="4110361" cy="2339060"/>
+            </a:xfrm>
+          </p:grpSpPr>
+          <p:sp>
+            <p:nvSpPr>
+              <p:cNvPr id="4" name="Rectangle 3">
+                <a:extLst>
+                  <a:ext uri="{FF2B5EF4-FFF2-40B4-BE49-F238E27FC236}">
+                    <a16:creationId xmlns:a16="http://schemas.microsoft.com/office/drawing/2014/main" id="{8D9B3716-6CE4-4E6F-BAF0-DC9767C4DB84}"/>
+                  </a:ext>
+                </a:extLst>
+              </p:cNvPr>
+              <p:cNvSpPr/>
+              <p:nvPr/>
+            </p:nvSpPr>
+            <p:spPr>
+              <a:xfrm>
+                <a:off x="3515557" y="1393797"/>
+                <a:ext cx="4110361" cy="1944208"/>
+              </a:xfrm>
+              <a:prstGeom prst="rect">
+                <a:avLst/>
+              </a:prstGeom>
+              <a:noFill/>
+              <a:ln w="38100">
+                <a:solidFill>
+                  <a:schemeClr val="tx1"/>
+                </a:solidFill>
+              </a:ln>
+            </p:spPr>
+            <p:style>
+              <a:lnRef idx="2">
+                <a:schemeClr val="accent1">
+                  <a:shade val="50000"/>
+                </a:schemeClr>
+              </a:lnRef>
+              <a:fillRef idx="1">
+                <a:schemeClr val="accent1"/>
+              </a:fillRef>
+              <a:effectRef idx="0">
+                <a:schemeClr val="accent1"/>
+              </a:effectRef>
+              <a:fontRef idx="minor">
+                <a:schemeClr val="lt1"/>
+              </a:fontRef>
+            </p:style>
+            <p:txBody>
+              <a:bodyPr rtlCol="0" anchor="ctr"/>
+              <a:lstStyle/>
+              <a:p>
+                <a:pPr algn="ctr"/>
+                <a:endParaRPr lang="en-US"/>
+              </a:p>
+            </p:txBody>
+          </p:sp>
+          <p:sp>
+            <p:nvSpPr>
+              <p:cNvPr id="7" name="TextBox 6">
+                <a:extLst>
+                  <a:ext uri="{FF2B5EF4-FFF2-40B4-BE49-F238E27FC236}">
+                    <a16:creationId xmlns:a16="http://schemas.microsoft.com/office/drawing/2014/main" id="{DBA18013-10A2-458D-AC0C-6C675F625E77}"/>
+                  </a:ext>
+                </a:extLst>
+              </p:cNvPr>
+              <p:cNvSpPr txBox="1"/>
+              <p:nvPr/>
+            </p:nvSpPr>
+            <p:spPr>
+              <a:xfrm>
+                <a:off x="6582611" y="1440892"/>
+                <a:ext cx="906017" cy="1754326"/>
+              </a:xfrm>
+              <a:prstGeom prst="rect">
+                <a:avLst/>
+              </a:prstGeom>
+              <a:noFill/>
+            </p:spPr>
+            <p:txBody>
+              <a:bodyPr wrap="none" rtlCol="0">
+                <a:spAutoFit/>
+              </a:bodyPr>
+              <a:lstStyle/>
+              <a:p>
+                <a:r>
+                  <a:rPr lang="en-US" b="1" dirty="0"/>
+                  <a:t>Output</a:t>
+                </a:r>
+              </a:p>
+              <a:p>
+                <a:r>
+                  <a:rPr lang="en-US" dirty="0"/>
+                  <a:t>NRE_1</a:t>
+                </a:r>
+              </a:p>
+              <a:p>
+                <a:r>
+                  <a:rPr lang="en-US" dirty="0"/>
+                  <a:t>NRE_2</a:t>
+                </a:r>
+              </a:p>
+              <a:p>
+                <a:r>
+                  <a:rPr lang="en-US" dirty="0"/>
+                  <a:t>ADC</a:t>
+                </a:r>
+              </a:p>
+              <a:p>
+                <a:r>
+                  <a:rPr lang="en-US" dirty="0"/>
+                  <a:t>EXPOSE</a:t>
+                </a:r>
+              </a:p>
+              <a:p>
+                <a:r>
+                  <a:rPr lang="en-US" dirty="0"/>
+                  <a:t>ERASE</a:t>
+                </a:r>
+              </a:p>
+            </p:txBody>
+          </p:sp>
+          <p:sp>
+            <p:nvSpPr>
+              <p:cNvPr id="9" name="TextBox 8">
+                <a:extLst>
+                  <a:ext uri="{FF2B5EF4-FFF2-40B4-BE49-F238E27FC236}">
+                    <a16:creationId xmlns:a16="http://schemas.microsoft.com/office/drawing/2014/main" id="{FAF4BC29-493D-49AE-B129-FA6561568DE1}"/>
+                  </a:ext>
+                </a:extLst>
+              </p:cNvPr>
+              <p:cNvSpPr txBox="1"/>
+              <p:nvPr/>
+            </p:nvSpPr>
+            <p:spPr>
+              <a:xfrm>
+                <a:off x="5345526" y="1444838"/>
+                <a:ext cx="1062855" cy="1200329"/>
+              </a:xfrm>
+              <a:prstGeom prst="rect">
+                <a:avLst/>
+              </a:prstGeom>
+              <a:noFill/>
+            </p:spPr>
+            <p:txBody>
+              <a:bodyPr wrap="none" rtlCol="0">
+                <a:spAutoFit/>
+              </a:bodyPr>
+              <a:lstStyle/>
+              <a:p>
+                <a:r>
+                  <a:rPr lang="en-US" b="1" dirty="0"/>
+                  <a:t>Internal</a:t>
+                </a:r>
+              </a:p>
+              <a:p>
+                <a:r>
+                  <a:rPr lang="en-US" dirty="0" err="1"/>
+                  <a:t>exp_time</a:t>
+                </a:r>
+                <a:endParaRPr lang="en-US" dirty="0"/>
+              </a:p>
+              <a:p>
+                <a:r>
+                  <a:rPr lang="en-US" dirty="0" err="1"/>
+                  <a:t>cnt</a:t>
+                </a:r>
+                <a:endParaRPr lang="en-US" dirty="0"/>
+              </a:p>
+              <a:p>
+                <a:r>
+                  <a:rPr lang="en-US" dirty="0"/>
+                  <a:t>state</a:t>
+                </a:r>
+              </a:p>
+            </p:txBody>
+          </p:sp>
+          <p:sp>
+            <p:nvSpPr>
+              <p:cNvPr id="13" name="TextBox 12">
+                <a:extLst>
+                  <a:ext uri="{FF2B5EF4-FFF2-40B4-BE49-F238E27FC236}">
+                    <a16:creationId xmlns:a16="http://schemas.microsoft.com/office/drawing/2014/main" id="{59262D2F-341E-4127-81ED-2BFAA0B15A6E}"/>
+                  </a:ext>
+                </a:extLst>
+              </p:cNvPr>
+              <p:cNvSpPr txBox="1"/>
+              <p:nvPr/>
+            </p:nvSpPr>
+            <p:spPr>
+              <a:xfrm>
+                <a:off x="4603805" y="998945"/>
+                <a:ext cx="1933863" cy="369332"/>
+              </a:xfrm>
+              <a:prstGeom prst="rect">
+                <a:avLst/>
+              </a:prstGeom>
+              <a:noFill/>
+            </p:spPr>
+            <p:txBody>
+              <a:bodyPr wrap="none" rtlCol="0">
+                <a:spAutoFit/>
+              </a:bodyPr>
+              <a:lstStyle/>
+              <a:p>
+                <a:r>
+                  <a:rPr lang="en-US" dirty="0" err="1"/>
+                  <a:t>camera_controller</a:t>
+                </a:r>
+                <a:endParaRPr lang="en-US" dirty="0"/>
+              </a:p>
+            </p:txBody>
+          </p:sp>
+          <p:sp>
+            <p:nvSpPr>
+              <p:cNvPr id="27" name="TextBox 26">
+                <a:extLst>
+                  <a:ext uri="{FF2B5EF4-FFF2-40B4-BE49-F238E27FC236}">
+                    <a16:creationId xmlns:a16="http://schemas.microsoft.com/office/drawing/2014/main" id="{306BC8AC-7C94-476B-AFE5-ECA1F46D8D28}"/>
+                  </a:ext>
+                </a:extLst>
+              </p:cNvPr>
+              <p:cNvSpPr txBox="1"/>
+              <p:nvPr/>
+            </p:nvSpPr>
+            <p:spPr>
+              <a:xfrm>
+                <a:off x="3694249" y="1444838"/>
+                <a:ext cx="1476623" cy="1754326"/>
+              </a:xfrm>
+              <a:prstGeom prst="rect">
+                <a:avLst/>
+              </a:prstGeom>
+              <a:noFill/>
+            </p:spPr>
+            <p:txBody>
+              <a:bodyPr wrap="none" rtlCol="0">
+                <a:spAutoFit/>
+              </a:bodyPr>
+              <a:lstStyle/>
+              <a:p>
+                <a:r>
+                  <a:rPr lang="en-US" b="1" dirty="0"/>
+                  <a:t>Input</a:t>
+                </a:r>
+              </a:p>
+              <a:p>
+                <a:r>
+                  <a:rPr lang="en-US" dirty="0" err="1"/>
+                  <a:t>init</a:t>
+                </a:r>
+                <a:endParaRPr lang="en-US" dirty="0"/>
+              </a:p>
+              <a:p>
+                <a:r>
+                  <a:rPr lang="en-US" dirty="0" err="1"/>
+                  <a:t>exp_increase</a:t>
+                </a:r>
+                <a:endParaRPr lang="en-US" dirty="0"/>
+              </a:p>
+              <a:p>
+                <a:r>
+                  <a:rPr lang="en-US" dirty="0" err="1"/>
+                  <a:t>exp_decrease</a:t>
+                </a:r>
+                <a:endParaRPr lang="en-US" dirty="0"/>
+              </a:p>
+              <a:p>
+                <a:r>
+                  <a:rPr lang="en-US" dirty="0" err="1"/>
+                  <a:t>clk</a:t>
+                </a:r>
+                <a:endParaRPr lang="en-US" dirty="0"/>
+              </a:p>
+              <a:p>
+                <a:r>
+                  <a:rPr lang="en-US" dirty="0" err="1"/>
+                  <a:t>rst</a:t>
+                </a:r>
+                <a:endParaRPr lang="en-US" dirty="0"/>
+              </a:p>
+            </p:txBody>
+          </p:sp>
+          <p:sp>
+            <p:nvSpPr>
+              <p:cNvPr id="30" name="Isosceles Triangle 29">
+                <a:extLst>
+                  <a:ext uri="{FF2B5EF4-FFF2-40B4-BE49-F238E27FC236}">
+                    <a16:creationId xmlns:a16="http://schemas.microsoft.com/office/drawing/2014/main" id="{BFA80F92-EB9C-48F1-B1DD-39B158D031BD}"/>
+                  </a:ext>
+                </a:extLst>
+              </p:cNvPr>
+              <p:cNvSpPr/>
+              <p:nvPr/>
+            </p:nvSpPr>
+            <p:spPr>
+              <a:xfrm rot="5400000">
+                <a:off x="3472279" y="2642304"/>
+                <a:ext cx="316975" cy="222342"/>
+              </a:xfrm>
+              <a:prstGeom prst="triangle">
+                <a:avLst/>
+              </a:prstGeom>
+              <a:noFill/>
+              <a:ln w="38100">
+                <a:solidFill>
+                  <a:schemeClr val="tx1"/>
+                </a:solidFill>
+              </a:ln>
+            </p:spPr>
+            <p:style>
+              <a:lnRef idx="2">
+                <a:schemeClr val="accent1">
+                  <a:shade val="50000"/>
+                </a:schemeClr>
+              </a:lnRef>
+              <a:fillRef idx="1">
+                <a:schemeClr val="accent1"/>
+              </a:fillRef>
+              <a:effectRef idx="0">
+                <a:schemeClr val="accent1"/>
+              </a:effectRef>
+              <a:fontRef idx="minor">
+                <a:schemeClr val="lt1"/>
+              </a:fontRef>
+            </p:style>
+            <p:txBody>
+              <a:bodyPr rtlCol="0" anchor="ctr"/>
+              <a:lstStyle/>
+              <a:p>
+                <a:pPr algn="ctr"/>
+                <a:endParaRPr lang="en-US"/>
+              </a:p>
+            </p:txBody>
+          </p:sp>
+        </p:grpSp>
+        <p:cxnSp>
+          <p:nvCxnSpPr>
+            <p:cNvPr id="33" name="Straight Connector 32">
+              <a:extLst>
+                <a:ext uri="{FF2B5EF4-FFF2-40B4-BE49-F238E27FC236}">
+                  <a16:creationId xmlns:a16="http://schemas.microsoft.com/office/drawing/2014/main" id="{6B0E4906-8115-41CC-B0E8-58F1CD32B2DE}"/>
+                </a:ext>
+              </a:extLst>
+            </p:cNvPr>
+            <p:cNvCxnSpPr>
+              <a:cxnSpLocks/>
+            </p:cNvCxnSpPr>
+            <p:nvPr/>
+          </p:nvCxnSpPr>
+          <p:spPr>
+            <a:xfrm flipH="1">
+              <a:off x="3169328" y="2627791"/>
+              <a:ext cx="275210" cy="0"/>
+            </a:xfrm>
+            <a:prstGeom prst="line">
+              <a:avLst/>
+            </a:prstGeom>
+            <a:ln w="38100">
+              <a:solidFill>
+                <a:schemeClr val="tx1"/>
+              </a:solidFill>
+            </a:ln>
+          </p:spPr>
+          <p:style>
+            <a:lnRef idx="1">
+              <a:schemeClr val="accent1"/>
+            </a:lnRef>
+            <a:fillRef idx="0">
+              <a:schemeClr val="accent1"/>
+            </a:fillRef>
+            <a:effectRef idx="0">
+              <a:schemeClr val="accent1"/>
+            </a:effectRef>
+            <a:fontRef idx="minor">
+              <a:schemeClr val="tx1"/>
+            </a:fontRef>
+          </p:style>
+        </p:cxnSp>
+        <p:cxnSp>
+          <p:nvCxnSpPr>
+            <p:cNvPr id="34" name="Straight Connector 33">
+              <a:extLst>
+                <a:ext uri="{FF2B5EF4-FFF2-40B4-BE49-F238E27FC236}">
+                  <a16:creationId xmlns:a16="http://schemas.microsoft.com/office/drawing/2014/main" id="{4344D6A1-25EE-4A55-B472-B18D6C291811}"/>
+                </a:ext>
+              </a:extLst>
+            </p:cNvPr>
+            <p:cNvCxnSpPr>
+              <a:cxnSpLocks/>
+            </p:cNvCxnSpPr>
+            <p:nvPr/>
+          </p:nvCxnSpPr>
+          <p:spPr>
+            <a:xfrm flipH="1">
+              <a:off x="3177704" y="2904482"/>
+              <a:ext cx="259433" cy="0"/>
+            </a:xfrm>
+            <a:prstGeom prst="line">
+              <a:avLst/>
+            </a:prstGeom>
+            <a:ln w="38100">
+              <a:solidFill>
+                <a:schemeClr val="tx1"/>
+              </a:solidFill>
+            </a:ln>
+          </p:spPr>
+          <p:style>
+            <a:lnRef idx="1">
+              <a:schemeClr val="accent1"/>
+            </a:lnRef>
+            <a:fillRef idx="0">
+              <a:schemeClr val="accent1"/>
+            </a:fillRef>
+            <a:effectRef idx="0">
+              <a:schemeClr val="accent1"/>
+            </a:effectRef>
+            <a:fontRef idx="minor">
+              <a:schemeClr val="tx1"/>
+            </a:fontRef>
+          </p:style>
+        </p:cxnSp>
+        <p:cxnSp>
+          <p:nvCxnSpPr>
+            <p:cNvPr id="35" name="Straight Connector 34">
+              <a:extLst>
+                <a:ext uri="{FF2B5EF4-FFF2-40B4-BE49-F238E27FC236}">
+                  <a16:creationId xmlns:a16="http://schemas.microsoft.com/office/drawing/2014/main" id="{76B2ADAC-18AF-49E0-B650-7CEF9AEB810A}"/>
+                </a:ext>
+              </a:extLst>
+            </p:cNvPr>
+            <p:cNvCxnSpPr>
+              <a:cxnSpLocks/>
+            </p:cNvCxnSpPr>
+            <p:nvPr/>
+          </p:nvCxnSpPr>
+          <p:spPr>
+            <a:xfrm flipH="1" flipV="1">
+              <a:off x="3177704" y="3181169"/>
+              <a:ext cx="252032" cy="1"/>
+            </a:xfrm>
+            <a:prstGeom prst="line">
+              <a:avLst/>
+            </a:prstGeom>
+            <a:ln w="38100">
+              <a:solidFill>
+                <a:schemeClr val="tx1"/>
+              </a:solidFill>
+            </a:ln>
+          </p:spPr>
+          <p:style>
+            <a:lnRef idx="1">
+              <a:schemeClr val="accent1"/>
+            </a:lnRef>
+            <a:fillRef idx="0">
+              <a:schemeClr val="accent1"/>
+            </a:fillRef>
+            <a:effectRef idx="0">
+              <a:schemeClr val="accent1"/>
+            </a:effectRef>
+            <a:fontRef idx="minor">
+              <a:schemeClr val="tx1"/>
+            </a:fontRef>
+          </p:style>
+        </p:cxnSp>
+        <p:cxnSp>
+          <p:nvCxnSpPr>
+            <p:cNvPr id="36" name="Straight Connector 35">
+              <a:extLst>
+                <a:ext uri="{FF2B5EF4-FFF2-40B4-BE49-F238E27FC236}">
+                  <a16:creationId xmlns:a16="http://schemas.microsoft.com/office/drawing/2014/main" id="{787386C9-1C0C-403A-B687-FC91772DD2E3}"/>
+                </a:ext>
+              </a:extLst>
+            </p:cNvPr>
+            <p:cNvCxnSpPr>
+              <a:cxnSpLocks/>
+            </p:cNvCxnSpPr>
+            <p:nvPr/>
+          </p:nvCxnSpPr>
+          <p:spPr>
+            <a:xfrm flipH="1" flipV="1">
+              <a:off x="3169328" y="3429000"/>
+              <a:ext cx="270765" cy="2227"/>
+            </a:xfrm>
+            <a:prstGeom prst="line">
+              <a:avLst/>
+            </a:prstGeom>
+            <a:ln w="38100">
+              <a:solidFill>
+                <a:schemeClr val="tx1"/>
+              </a:solidFill>
+            </a:ln>
+          </p:spPr>
+          <p:style>
+            <a:lnRef idx="1">
+              <a:schemeClr val="accent1"/>
+            </a:lnRef>
+            <a:fillRef idx="0">
+              <a:schemeClr val="accent1"/>
+            </a:fillRef>
+            <a:effectRef idx="0">
+              <a:schemeClr val="accent1"/>
+            </a:effectRef>
+            <a:fontRef idx="minor">
+              <a:schemeClr val="tx1"/>
+            </a:fontRef>
+          </p:style>
+        </p:cxnSp>
+        <p:cxnSp>
+          <p:nvCxnSpPr>
+            <p:cNvPr id="37" name="Straight Connector 36">
+              <a:extLst>
+                <a:ext uri="{FF2B5EF4-FFF2-40B4-BE49-F238E27FC236}">
+                  <a16:creationId xmlns:a16="http://schemas.microsoft.com/office/drawing/2014/main" id="{C4C15D14-CBDA-455D-B692-986E3E6C4727}"/>
+                </a:ext>
+              </a:extLst>
+            </p:cNvPr>
+            <p:cNvCxnSpPr>
+              <a:cxnSpLocks/>
+            </p:cNvCxnSpPr>
+            <p:nvPr/>
+          </p:nvCxnSpPr>
+          <p:spPr>
+            <a:xfrm flipH="1">
+              <a:off x="3169328" y="3716795"/>
+              <a:ext cx="263364" cy="0"/>
+            </a:xfrm>
+            <a:prstGeom prst="line">
+              <a:avLst/>
+            </a:prstGeom>
+            <a:ln w="38100">
+              <a:solidFill>
+                <a:schemeClr val="tx1"/>
+              </a:solidFill>
+            </a:ln>
+          </p:spPr>
+          <p:style>
+            <a:lnRef idx="1">
+              <a:schemeClr val="accent1"/>
+            </a:lnRef>
+            <a:fillRef idx="0">
+              <a:schemeClr val="accent1"/>
+            </a:fillRef>
+            <a:effectRef idx="0">
+              <a:schemeClr val="accent1"/>
+            </a:effectRef>
+            <a:fontRef idx="minor">
+              <a:schemeClr val="tx1"/>
+            </a:fontRef>
+          </p:style>
+        </p:cxnSp>
+        <p:cxnSp>
+          <p:nvCxnSpPr>
+            <p:cNvPr id="38" name="Straight Connector 37">
+              <a:extLst>
+                <a:ext uri="{FF2B5EF4-FFF2-40B4-BE49-F238E27FC236}">
+                  <a16:creationId xmlns:a16="http://schemas.microsoft.com/office/drawing/2014/main" id="{BE67C2E6-EEE2-48A6-BDE2-AEE93C8A5677}"/>
+                </a:ext>
+              </a:extLst>
+            </p:cNvPr>
+            <p:cNvCxnSpPr>
+              <a:cxnSpLocks/>
+            </p:cNvCxnSpPr>
+            <p:nvPr/>
+          </p:nvCxnSpPr>
+          <p:spPr>
+            <a:xfrm flipH="1">
+              <a:off x="7544549" y="3736027"/>
+              <a:ext cx="267804" cy="0"/>
+            </a:xfrm>
+            <a:prstGeom prst="line">
+              <a:avLst/>
+            </a:prstGeom>
+            <a:ln w="38100">
+              <a:solidFill>
+                <a:schemeClr val="tx1"/>
+              </a:solidFill>
+            </a:ln>
+          </p:spPr>
+          <p:style>
+            <a:lnRef idx="1">
+              <a:schemeClr val="accent1"/>
+            </a:lnRef>
+            <a:fillRef idx="0">
+              <a:schemeClr val="accent1"/>
+            </a:fillRef>
+            <a:effectRef idx="0">
+              <a:schemeClr val="accent1"/>
+            </a:effectRef>
+            <a:fontRef idx="minor">
+              <a:schemeClr val="tx1"/>
+            </a:fontRef>
+          </p:style>
+        </p:cxnSp>
+        <p:cxnSp>
+          <p:nvCxnSpPr>
+            <p:cNvPr id="39" name="Straight Connector 38">
+              <a:extLst>
+                <a:ext uri="{FF2B5EF4-FFF2-40B4-BE49-F238E27FC236}">
+                  <a16:creationId xmlns:a16="http://schemas.microsoft.com/office/drawing/2014/main" id="{98B6C155-682C-450C-82DE-92C3C73AA7F8}"/>
+                </a:ext>
+              </a:extLst>
+            </p:cNvPr>
+            <p:cNvCxnSpPr>
+              <a:cxnSpLocks/>
+            </p:cNvCxnSpPr>
+            <p:nvPr/>
+          </p:nvCxnSpPr>
+          <p:spPr>
+            <a:xfrm flipH="1">
+              <a:off x="7546025" y="3444542"/>
+              <a:ext cx="266328" cy="0"/>
+            </a:xfrm>
+            <a:prstGeom prst="line">
+              <a:avLst/>
+            </a:prstGeom>
+            <a:ln w="38100">
+              <a:solidFill>
+                <a:schemeClr val="tx1"/>
+              </a:solidFill>
+            </a:ln>
+          </p:spPr>
+          <p:style>
+            <a:lnRef idx="1">
+              <a:schemeClr val="accent1"/>
+            </a:lnRef>
+            <a:fillRef idx="0">
+              <a:schemeClr val="accent1"/>
+            </a:fillRef>
+            <a:effectRef idx="0">
+              <a:schemeClr val="accent1"/>
+            </a:effectRef>
+            <a:fontRef idx="minor">
+              <a:schemeClr val="tx1"/>
+            </a:fontRef>
+          </p:style>
+        </p:cxnSp>
+        <p:cxnSp>
+          <p:nvCxnSpPr>
+            <p:cNvPr id="40" name="Straight Connector 39">
+              <a:extLst>
+                <a:ext uri="{FF2B5EF4-FFF2-40B4-BE49-F238E27FC236}">
+                  <a16:creationId xmlns:a16="http://schemas.microsoft.com/office/drawing/2014/main" id="{475113BC-0323-4A56-BA77-7C75BE28FFC4}"/>
+                </a:ext>
+              </a:extLst>
+            </p:cNvPr>
+            <p:cNvCxnSpPr>
+              <a:cxnSpLocks/>
+            </p:cNvCxnSpPr>
+            <p:nvPr/>
+          </p:nvCxnSpPr>
+          <p:spPr>
+            <a:xfrm flipH="1">
+              <a:off x="7556379" y="3161933"/>
+              <a:ext cx="255974" cy="0"/>
+            </a:xfrm>
+            <a:prstGeom prst="line">
+              <a:avLst/>
+            </a:prstGeom>
+            <a:ln w="38100">
+              <a:solidFill>
+                <a:schemeClr val="tx1"/>
+              </a:solidFill>
+            </a:ln>
+          </p:spPr>
+          <p:style>
+            <a:lnRef idx="1">
+              <a:schemeClr val="accent1"/>
+            </a:lnRef>
+            <a:fillRef idx="0">
+              <a:schemeClr val="accent1"/>
+            </a:fillRef>
+            <a:effectRef idx="0">
+              <a:schemeClr val="accent1"/>
+            </a:effectRef>
+            <a:fontRef idx="minor">
+              <a:schemeClr val="tx1"/>
+            </a:fontRef>
+          </p:style>
+        </p:cxnSp>
+        <p:cxnSp>
+          <p:nvCxnSpPr>
+            <p:cNvPr id="41" name="Straight Connector 40">
+              <a:extLst>
+                <a:ext uri="{FF2B5EF4-FFF2-40B4-BE49-F238E27FC236}">
+                  <a16:creationId xmlns:a16="http://schemas.microsoft.com/office/drawing/2014/main" id="{060FD950-32A2-482F-9E63-4CF44EADA8B3}"/>
+                </a:ext>
+              </a:extLst>
+            </p:cNvPr>
+            <p:cNvCxnSpPr>
+              <a:cxnSpLocks/>
+            </p:cNvCxnSpPr>
+            <p:nvPr/>
+          </p:nvCxnSpPr>
+          <p:spPr>
+            <a:xfrm flipH="1">
+              <a:off x="7566735" y="2891921"/>
+              <a:ext cx="245618" cy="5158"/>
+            </a:xfrm>
+            <a:prstGeom prst="line">
+              <a:avLst/>
+            </a:prstGeom>
+            <a:ln w="38100">
+              <a:solidFill>
+                <a:schemeClr val="tx1"/>
+              </a:solidFill>
+            </a:ln>
+          </p:spPr>
+          <p:style>
+            <a:lnRef idx="1">
+              <a:schemeClr val="accent1"/>
+            </a:lnRef>
+            <a:fillRef idx="0">
+              <a:schemeClr val="accent1"/>
+            </a:fillRef>
+            <a:effectRef idx="0">
+              <a:schemeClr val="accent1"/>
+            </a:effectRef>
+            <a:fontRef idx="minor">
+              <a:schemeClr val="tx1"/>
+            </a:fontRef>
+          </p:style>
+        </p:cxnSp>
+        <p:cxnSp>
+          <p:nvCxnSpPr>
+            <p:cNvPr id="42" name="Straight Connector 41">
+              <a:extLst>
+                <a:ext uri="{FF2B5EF4-FFF2-40B4-BE49-F238E27FC236}">
+                  <a16:creationId xmlns:a16="http://schemas.microsoft.com/office/drawing/2014/main" id="{D62E974A-3F5E-4DFD-985D-4E27A8ABB7BE}"/>
+                </a:ext>
+              </a:extLst>
+            </p:cNvPr>
+            <p:cNvCxnSpPr>
+              <a:cxnSpLocks/>
+            </p:cNvCxnSpPr>
+            <p:nvPr/>
+          </p:nvCxnSpPr>
+          <p:spPr>
+            <a:xfrm flipH="1">
+              <a:off x="7559336" y="2605589"/>
+              <a:ext cx="253017" cy="0"/>
+            </a:xfrm>
+            <a:prstGeom prst="line">
+              <a:avLst/>
+            </a:prstGeom>
+            <a:ln w="38100">
+              <a:solidFill>
+                <a:schemeClr val="tx1"/>
+              </a:solidFill>
+            </a:ln>
+          </p:spPr>
+          <p:style>
+            <a:lnRef idx="1">
+              <a:schemeClr val="accent1"/>
+            </a:lnRef>
+            <a:fillRef idx="0">
+              <a:schemeClr val="accent1"/>
+            </a:fillRef>
+            <a:effectRef idx="0">
+              <a:schemeClr val="accent1"/>
+            </a:effectRef>
+            <a:fontRef idx="minor">
+              <a:schemeClr val="tx1"/>
+            </a:fontRef>
+          </p:style>
+        </p:cxnSp>
+      </p:grpSp>
+    </p:spTree>
+    <p:extLst>
+      <p:ext uri="{BB962C8B-B14F-4D97-AF65-F5344CB8AC3E}">
+        <p14:creationId xmlns:p14="http://schemas.microsoft.com/office/powerpoint/2010/main" val="3459138933"/>
       </p:ext>
     </p:extLst>
   </p:cSld>

</xml_diff>